<commit_message>
Closes #1 CLoses #2
</commit_message>
<xml_diff>
--- a/2017/python/day2-review.pptx
+++ b/2017/python/day2-review.pptx
@@ -226,7 +226,7 @@
           <a:p>
             <a:fld id="{91BDCAE1-DC13-3545-841A-A4DBCAED93AF}" type="datetimeFigureOut">
               <a:rPr lang="en-US" smtClean="0"/>
-              <a:t>6/1/2017</a:t>
+              <a:t>6/2/17</a:t>
             </a:fld>
             <a:endParaRPr lang="en-US"/>
           </a:p>
@@ -2763,7 +2763,7 @@
           <a:p>
             <a:fld id="{7C780E36-1438-D74D-8D9C-3089FABA7E39}" type="datetimeFigureOut">
               <a:rPr lang="en-US" smtClean="0"/>
-              <a:t>6/1/2017</a:t>
+              <a:t>6/2/17</a:t>
             </a:fld>
             <a:endParaRPr lang="en-US"/>
           </a:p>
@@ -2933,7 +2933,7 @@
           <a:p>
             <a:fld id="{7C780E36-1438-D74D-8D9C-3089FABA7E39}" type="datetimeFigureOut">
               <a:rPr lang="en-US" smtClean="0"/>
-              <a:t>6/1/2017</a:t>
+              <a:t>6/2/17</a:t>
             </a:fld>
             <a:endParaRPr lang="en-US"/>
           </a:p>
@@ -3113,7 +3113,7 @@
           <a:p>
             <a:fld id="{7C780E36-1438-D74D-8D9C-3089FABA7E39}" type="datetimeFigureOut">
               <a:rPr lang="en-US" smtClean="0"/>
-              <a:t>6/1/2017</a:t>
+              <a:t>6/2/17</a:t>
             </a:fld>
             <a:endParaRPr lang="en-US"/>
           </a:p>
@@ -3588,7 +3588,7 @@
           <a:p>
             <a:fld id="{7C780E36-1438-D74D-8D9C-3089FABA7E39}" type="datetimeFigureOut">
               <a:rPr lang="en-US" smtClean="0"/>
-              <a:t>6/1/2017</a:t>
+              <a:t>6/2/17</a:t>
             </a:fld>
             <a:endParaRPr lang="en-US"/>
           </a:p>
@@ -3834,7 +3834,7 @@
           <a:p>
             <a:fld id="{7C780E36-1438-D74D-8D9C-3089FABA7E39}" type="datetimeFigureOut">
               <a:rPr lang="en-US" smtClean="0"/>
-              <a:t>6/1/2017</a:t>
+              <a:t>6/2/17</a:t>
             </a:fld>
             <a:endParaRPr lang="en-US"/>
           </a:p>
@@ -4122,7 +4122,7 @@
           <a:p>
             <a:fld id="{7C780E36-1438-D74D-8D9C-3089FABA7E39}" type="datetimeFigureOut">
               <a:rPr lang="en-US" smtClean="0"/>
-              <a:t>6/1/2017</a:t>
+              <a:t>6/2/17</a:t>
             </a:fld>
             <a:endParaRPr lang="en-US"/>
           </a:p>
@@ -4544,7 +4544,7 @@
           <a:p>
             <a:fld id="{7C780E36-1438-D74D-8D9C-3089FABA7E39}" type="datetimeFigureOut">
               <a:rPr lang="en-US" smtClean="0"/>
-              <a:t>6/1/2017</a:t>
+              <a:t>6/2/17</a:t>
             </a:fld>
             <a:endParaRPr lang="en-US"/>
           </a:p>
@@ -4662,7 +4662,7 @@
           <a:p>
             <a:fld id="{7C780E36-1438-D74D-8D9C-3089FABA7E39}" type="datetimeFigureOut">
               <a:rPr lang="en-US" smtClean="0"/>
-              <a:t>6/1/2017</a:t>
+              <a:t>6/2/17</a:t>
             </a:fld>
             <a:endParaRPr lang="en-US"/>
           </a:p>
@@ -4757,7 +4757,7 @@
           <a:p>
             <a:fld id="{7C780E36-1438-D74D-8D9C-3089FABA7E39}" type="datetimeFigureOut">
               <a:rPr lang="en-US" smtClean="0"/>
-              <a:t>6/1/2017</a:t>
+              <a:t>6/2/17</a:t>
             </a:fld>
             <a:endParaRPr lang="en-US"/>
           </a:p>
@@ -5034,7 +5034,7 @@
           <a:p>
             <a:fld id="{7C780E36-1438-D74D-8D9C-3089FABA7E39}" type="datetimeFigureOut">
               <a:rPr lang="en-US" smtClean="0"/>
-              <a:t>6/1/2017</a:t>
+              <a:t>6/2/17</a:t>
             </a:fld>
             <a:endParaRPr lang="en-US"/>
           </a:p>
@@ -5287,7 +5287,7 @@
           <a:p>
             <a:fld id="{7C780E36-1438-D74D-8D9C-3089FABA7E39}" type="datetimeFigureOut">
               <a:rPr lang="en-US" smtClean="0"/>
-              <a:t>6/1/2017</a:t>
+              <a:t>6/2/17</a:t>
             </a:fld>
             <a:endParaRPr lang="en-US"/>
           </a:p>
@@ -5500,7 +5500,7 @@
           <a:p>
             <a:fld id="{7C780E36-1438-D74D-8D9C-3089FABA7E39}" type="datetimeFigureOut">
               <a:rPr lang="en-US" smtClean="0"/>
-              <a:t>6/1/2017</a:t>
+              <a:t>6/2/17</a:t>
             </a:fld>
             <a:endParaRPr lang="en-US"/>
           </a:p>
@@ -6116,7 +6116,6 @@
               <a:rPr lang="en-US" sz="2400" dirty="0" smtClean="0"/>
               <a:t>):</a:t>
             </a:r>
-            <a:endParaRPr lang="en-US" sz="2400" dirty="0" smtClean="0"/>
           </a:p>
           <a:p>
             <a:pPr marL="38100" lvl="0" indent="0">
@@ -6139,13 +6138,8 @@
             </a:r>
             <a:r>
               <a:rPr lang="en-US" sz="2400" dirty="0" smtClean="0"/>
-              <a:t> exists here</a:t>
-            </a:r>
-            <a:r>
-              <a:rPr lang="en-US" sz="2400" dirty="0" smtClean="0"/>
-              <a:t>!</a:t>
-            </a:r>
-            <a:endParaRPr lang="en-US" sz="2400" dirty="0" smtClean="0"/>
+              <a:t> exists here!</a:t>
+            </a:r>
           </a:p>
           <a:p>
             <a:pPr marL="38100" lvl="0" indent="0">
@@ -6402,7 +6396,6 @@
               <a:rPr lang="en-US" sz="2400" dirty="0" smtClean="0"/>
               <a:t>):</a:t>
             </a:r>
-            <a:endParaRPr lang="en-US" sz="2400" dirty="0" smtClean="0"/>
           </a:p>
           <a:p>
             <a:pPr marL="38100" lvl="0" indent="0">
@@ -6417,23 +6410,11 @@
             </a:pPr>
             <a:r>
               <a:rPr lang="en-US" sz="2400" dirty="0" smtClean="0"/>
-              <a:t>		</a:t>
-            </a:r>
-            <a:r>
-              <a:rPr lang="en-US" sz="2400" dirty="0" smtClean="0"/>
-              <a:t>print(“</a:t>
-            </a:r>
-            <a:r>
-              <a:rPr lang="en-US" sz="2400" dirty="0" smtClean="0"/>
-              <a:t>a </a:t>
+              <a:t>		print(“a </a:t>
             </a:r>
             <a:r>
               <a:rPr lang="en-US" sz="2400" smtClean="0"/>
-              <a:t>thing</a:t>
-            </a:r>
-            <a:r>
-              <a:rPr lang="en-US" sz="2400" smtClean="0"/>
-              <a:t>”)</a:t>
+              <a:t>thing”)</a:t>
             </a:r>
             <a:endParaRPr lang="en-US" sz="2400" dirty="0" smtClean="0"/>
           </a:p>
@@ -7340,6 +7321,57 @@
               <a:tabLst/>
               <a:defRPr/>
             </a:pPr>
+            <a:r>
+              <a:rPr lang="en-US" dirty="0"/>
+              <a:t>Keep going!</a:t>
+            </a:r>
+          </a:p>
+          <a:p>
+            <a:pPr marL="457200" marR="0" lvl="0" indent="-419100" defTabSz="914400" eaLnBrk="1" fontAlgn="auto" latinLnBrk="0" hangingPunct="1">
+              <a:lnSpc>
+                <a:spcPct val="130000"/>
+              </a:lnSpc>
+              <a:spcBef>
+                <a:spcPts val="0"/>
+              </a:spcBef>
+              <a:spcAft>
+                <a:spcPts val="0"/>
+              </a:spcAft>
+              <a:buClr>
+                <a:schemeClr val="dk1"/>
+              </a:buClr>
+              <a:buSzPct val="100000"/>
+              <a:buFontTx/>
+              <a:buNone/>
+              <a:tabLst/>
+              <a:defRPr/>
+            </a:pPr>
+            <a:endParaRPr lang="en-US" dirty="0"/>
+          </a:p>
+          <a:p>
+            <a:pPr marL="457200" marR="0" lvl="0" indent="-419100" defTabSz="914400" eaLnBrk="1" fontAlgn="auto" latinLnBrk="0" hangingPunct="1">
+              <a:lnSpc>
+                <a:spcPct val="130000"/>
+              </a:lnSpc>
+              <a:spcBef>
+                <a:spcPts val="0"/>
+              </a:spcBef>
+              <a:spcAft>
+                <a:spcPts val="0"/>
+              </a:spcAft>
+              <a:buClr>
+                <a:schemeClr val="dk1"/>
+              </a:buClr>
+              <a:buSzPct val="100000"/>
+              <a:buFontTx/>
+              <a:buNone/>
+              <a:tabLst/>
+              <a:defRPr/>
+            </a:pPr>
+            <a:r>
+              <a:rPr lang="en-US" dirty="0"/>
+              <a:t>But we take requests!</a:t>
+            </a:r>
             <a:endParaRPr lang="en-US" dirty="0"/>
           </a:p>
         </p:txBody>
@@ -8181,23 +8213,6 @@
             </a:pPr>
             <a:r>
               <a:rPr lang="en-US" dirty="0" smtClean="0"/>
-              <a:t>What is a splat?</a:t>
-            </a:r>
-          </a:p>
-          <a:p>
-            <a:pPr marL="457200" lvl="0" indent="-419100">
-              <a:lnSpc>
-                <a:spcPct val="130000"/>
-              </a:lnSpc>
-              <a:buClr>
-                <a:schemeClr val="dk1"/>
-              </a:buClr>
-              <a:buSzPct val="100000"/>
-              <a:buFont typeface="Arial"/>
-              <a:buChar char="●"/>
-            </a:pPr>
-            <a:r>
-              <a:rPr lang="en-US" dirty="0" smtClean="0"/>
               <a:t>How do you print something to the console?</a:t>
             </a:r>
             <a:endParaRPr lang="en-US" dirty="0"/>
@@ -8350,23 +8365,7 @@
             </a:pPr>
             <a:r>
               <a:rPr lang="en-US" dirty="0" smtClean="0"/>
-              <a:t>What is </a:t>
-            </a:r>
-            <a:r>
-              <a:rPr lang="en" dirty="0">
-                <a:solidFill>
-                  <a:srgbClr val="006699"/>
-                </a:solidFill>
-                <a:latin typeface="Menlo Regular"/>
-                <a:ea typeface="Menlo Regular"/>
-                <a:cs typeface="Menlo Regular"/>
-                <a:sym typeface="Courier New"/>
-              </a:rPr>
-              <a:t>ARGV</a:t>
-            </a:r>
-            <a:r>
-              <a:rPr lang="en-US" dirty="0" smtClean="0"/>
-              <a:t>?</a:t>
+              <a:t>What is an argument?</a:t>
             </a:r>
           </a:p>
           <a:p>
@@ -8695,7 +8694,6 @@
               <a:rPr lang="en-US" dirty="0" smtClean="0"/>
               <a:t>():</a:t>
             </a:r>
-            <a:endParaRPr lang="en-US" dirty="0" smtClean="0"/>
           </a:p>
           <a:p>
             <a:pPr marL="38100" lvl="0" indent="0">
@@ -8712,7 +8710,6 @@
               <a:rPr lang="en-US" dirty="0" smtClean="0"/>
               <a:t>	# what the method does!</a:t>
             </a:r>
-            <a:endParaRPr lang="en-US" dirty="0" smtClean="0"/>
           </a:p>
           <a:p>
             <a:pPr marL="38100" lvl="0" indent="0">
@@ -8753,13 +8750,8 @@
             </a:pPr>
             <a:r>
               <a:rPr lang="en-US" dirty="0" smtClean="0"/>
-              <a:t>All methods start with a </a:t>
-            </a:r>
-            <a:r>
-              <a:rPr lang="en-US" dirty="0" smtClean="0"/>
-              <a:t>def.</a:t>
-            </a:r>
-            <a:endParaRPr lang="en-US" dirty="0" smtClean="0"/>
+              <a:t>All methods start with a def.</a:t>
+            </a:r>
           </a:p>
         </p:txBody>
       </p:sp>
@@ -8905,7 +8897,6 @@
               <a:rPr lang="en-US" dirty="0" smtClean="0"/>
               <a:t>():</a:t>
             </a:r>
-            <a:endParaRPr lang="en-US" dirty="0" smtClean="0"/>
           </a:p>
           <a:p>
             <a:pPr marL="38100" lvl="0" indent="0">
@@ -8922,7 +8913,6 @@
               <a:rPr lang="en-US" dirty="0" smtClean="0"/>
               <a:t>	…</a:t>
             </a:r>
-            <a:endParaRPr lang="en-US" dirty="0" smtClean="0"/>
           </a:p>
           <a:p>
             <a:pPr marL="38100" lvl="0" indent="0">
@@ -8939,7 +8929,6 @@
               <a:rPr lang="en-US" dirty="0" smtClean="0"/>
               <a:t>	…</a:t>
             </a:r>
-            <a:endParaRPr lang="en-US" dirty="0" smtClean="0"/>
           </a:p>
           <a:p>
             <a:pPr marL="38100" lvl="0" indent="0">
@@ -9176,7 +9165,6 @@
               <a:rPr lang="en-US" dirty="0" smtClean="0"/>
               <a:t>):</a:t>
             </a:r>
-            <a:endParaRPr lang="en-US" dirty="0" smtClean="0"/>
           </a:p>
           <a:p>
             <a:pPr marL="38100" lvl="0" indent="0">

</xml_diff>